<commit_message>
updated async and await part of PPT
</commit_message>
<xml_diff>
--- a/SPHERO.pptx
+++ b/SPHERO.pptx
@@ -10289,79 +10289,9 @@
   <p:timing>
     <p:tnLst>
       <p:par>
-        <p:cTn id="1" dur="indefinite" restart="never" nodeType="tmRoot">
-          <p:childTnLst>
-            <p:seq concurrent="1" nextAc="seek">
-              <p:cTn id="2" dur="indefinite" nodeType="mainSeq">
-                <p:childTnLst>
-                  <p:par>
-                    <p:cTn id="3" fill="hold">
-                      <p:stCondLst>
-                        <p:cond delay="indefinite"/>
-                      </p:stCondLst>
-                      <p:childTnLst>
-                        <p:par>
-                          <p:cTn id="4" fill="hold">
-                            <p:stCondLst>
-                              <p:cond delay="0"/>
-                            </p:stCondLst>
-                            <p:childTnLst>
-                              <p:par>
-                                <p:cTn id="5" presetID="26" presetClass="emph" presetSubtype="0" fill="hold" grpId="0" nodeType="clickEffect">
-                                  <p:stCondLst>
-                                    <p:cond delay="0"/>
-                                  </p:stCondLst>
-                                  <p:childTnLst>
-                                    <p:animEffect transition="out" filter="fade">
-                                      <p:cBhvr>
-                                        <p:cTn id="6" dur="500" tmFilter="0, 0; .2, .5; .8, .5; 1, 0"/>
-                                        <p:tgtEl>
-                                          <p:spTgt spid="4"/>
-                                        </p:tgtEl>
-                                      </p:cBhvr>
-                                    </p:animEffect>
-                                    <p:animScale>
-                                      <p:cBhvr>
-                                        <p:cTn id="7" dur="250" autoRev="1" fill="hold"/>
-                                        <p:tgtEl>
-                                          <p:spTgt spid="4"/>
-                                        </p:tgtEl>
-                                      </p:cBhvr>
-                                      <p:by x="105000" y="105000"/>
-                                    </p:animScale>
-                                  </p:childTnLst>
-                                </p:cTn>
-                              </p:par>
-                            </p:childTnLst>
-                          </p:cTn>
-                        </p:par>
-                      </p:childTnLst>
-                    </p:cTn>
-                  </p:par>
-                </p:childTnLst>
-              </p:cTn>
-              <p:prevCondLst>
-                <p:cond evt="onPrev" delay="0">
-                  <p:tgtEl>
-                    <p:sldTgt/>
-                  </p:tgtEl>
-                </p:cond>
-              </p:prevCondLst>
-              <p:nextCondLst>
-                <p:cond evt="onNext" delay="0">
-                  <p:tgtEl>
-                    <p:sldTgt/>
-                  </p:tgtEl>
-                </p:cond>
-              </p:nextCondLst>
-            </p:seq>
-          </p:childTnLst>
-        </p:cTn>
+        <p:cTn id="1" dur="indefinite" restart="never" nodeType="tmRoot"/>
       </p:par>
     </p:tnLst>
-    <p:bldLst>
-      <p:bldP spid="4" grpId="0"/>
-    </p:bldLst>
   </p:timing>
 </p:sld>
 </file>
@@ -10393,7 +10323,12 @@
             <p:ph type="title"/>
           </p:nvPr>
         </p:nvSpPr>
-        <p:spPr/>
+        <p:spPr>
+          <a:xfrm>
+            <a:off x="2738065" y="622293"/>
+            <a:ext cx="8911687" cy="1280890"/>
+          </a:xfrm>
+        </p:spPr>
         <p:txBody>
           <a:bodyPr>
             <a:normAutofit/>
@@ -10420,8 +10355,8 @@
         </p:nvSpPr>
         <p:spPr>
           <a:xfrm>
-            <a:off x="2592923" y="1264555"/>
-            <a:ext cx="6463991" cy="3385542"/>
+            <a:off x="2738065" y="1453240"/>
+            <a:ext cx="9018506" cy="4616648"/>
           </a:xfrm>
           <a:prstGeom prst="rect">
             <a:avLst/>
@@ -10441,6 +10376,261 @@
               <a:rPr lang="en-US" sz="1400" dirty="0"/>
             </a:br>
             <a:r>
+              <a:rPr lang="en-US" sz="2800" dirty="0">
+                <a:solidFill>
+                  <a:schemeClr val="tx1">
+                    <a:lumMod val="50000"/>
+                    <a:lumOff val="50000"/>
+                  </a:schemeClr>
+                </a:solidFill>
+                <a:latin typeface="+mj-lt"/>
+                <a:ea typeface="+mj-ea"/>
+                <a:cs typeface="+mj-cs"/>
+              </a:rPr>
+              <a:t>• Async functions are declared by prepending the word </a:t>
+            </a:r>
+            <a:r>
+              <a:rPr lang="en-US" sz="2800" dirty="0" err="1">
+                <a:solidFill>
+                  <a:schemeClr val="tx1">
+                    <a:lumMod val="50000"/>
+                    <a:lumOff val="50000"/>
+                  </a:schemeClr>
+                </a:solidFill>
+                <a:latin typeface="+mj-lt"/>
+                <a:ea typeface="+mj-ea"/>
+                <a:cs typeface="+mj-cs"/>
+              </a:rPr>
+              <a:t>async</a:t>
+            </a:r>
+            <a:r>
+              <a:rPr lang="en-US" sz="2800" dirty="0">
+                <a:solidFill>
+                  <a:schemeClr val="tx1">
+                    <a:lumMod val="50000"/>
+                    <a:lumOff val="50000"/>
+                  </a:schemeClr>
+                </a:solidFill>
+                <a:latin typeface="+mj-lt"/>
+                <a:ea typeface="+mj-ea"/>
+                <a:cs typeface="+mj-cs"/>
+              </a:rPr>
+              <a:t> in their declaration</a:t>
+            </a:r>
+          </a:p>
+          <a:p>
+            <a:r>
+              <a:rPr lang="en-US" sz="2800" dirty="0">
+                <a:solidFill>
+                  <a:schemeClr val="tx1">
+                    <a:lumMod val="50000"/>
+                    <a:lumOff val="50000"/>
+                  </a:schemeClr>
+                </a:solidFill>
+                <a:latin typeface="+mj-lt"/>
+                <a:ea typeface="+mj-ea"/>
+                <a:cs typeface="+mj-cs"/>
+              </a:rPr>
+              <a:t/>
+            </a:r>
+            <a:br>
+              <a:rPr lang="en-US" sz="2800" dirty="0">
+                <a:solidFill>
+                  <a:schemeClr val="tx1">
+                    <a:lumMod val="50000"/>
+                    <a:lumOff val="50000"/>
+                  </a:schemeClr>
+                </a:solidFill>
+                <a:latin typeface="+mj-lt"/>
+                <a:ea typeface="+mj-ea"/>
+                <a:cs typeface="+mj-cs"/>
+              </a:rPr>
+            </a:br>
+            <a:r>
+              <a:rPr lang="en-US" sz="2800" dirty="0">
+                <a:solidFill>
+                  <a:schemeClr val="tx1">
+                    <a:lumMod val="50000"/>
+                    <a:lumOff val="50000"/>
+                  </a:schemeClr>
+                </a:solidFill>
+                <a:latin typeface="+mj-lt"/>
+                <a:ea typeface="+mj-ea"/>
+                <a:cs typeface="+mj-cs"/>
+              </a:rPr>
+              <a:t>• Your code can be paused waiting for an Async Function with await</a:t>
+            </a:r>
+            <a:r>
+              <a:rPr lang="en-US" sz="2800" dirty="0">
+                <a:solidFill>
+                  <a:schemeClr val="tx1">
+                    <a:lumMod val="50000"/>
+                    <a:lumOff val="50000"/>
+                  </a:schemeClr>
+                </a:solidFill>
+                <a:latin typeface="+mj-lt"/>
+                <a:ea typeface="+mj-ea"/>
+                <a:cs typeface="+mj-cs"/>
+              </a:rPr>
+              <a:t>.</a:t>
+            </a:r>
+          </a:p>
+          <a:p>
+            <a:r>
+              <a:rPr lang="en-US" sz="2800" dirty="0">
+                <a:solidFill>
+                  <a:schemeClr val="tx1">
+                    <a:lumMod val="50000"/>
+                    <a:lumOff val="50000"/>
+                  </a:schemeClr>
+                </a:solidFill>
+                <a:latin typeface="+mj-lt"/>
+                <a:ea typeface="+mj-ea"/>
+                <a:cs typeface="+mj-cs"/>
+              </a:rPr>
+              <a:t/>
+            </a:r>
+            <a:br>
+              <a:rPr lang="en-US" sz="2800" dirty="0">
+                <a:solidFill>
+                  <a:schemeClr val="tx1">
+                    <a:lumMod val="50000"/>
+                    <a:lumOff val="50000"/>
+                  </a:schemeClr>
+                </a:solidFill>
+                <a:latin typeface="+mj-lt"/>
+                <a:ea typeface="+mj-ea"/>
+                <a:cs typeface="+mj-cs"/>
+              </a:rPr>
+            </a:br>
+            <a:r>
+              <a:rPr lang="en-US" sz="2800" dirty="0">
+                <a:solidFill>
+                  <a:schemeClr val="tx1">
+                    <a:lumMod val="50000"/>
+                    <a:lumOff val="50000"/>
+                  </a:schemeClr>
+                </a:solidFill>
+                <a:latin typeface="+mj-lt"/>
+                <a:ea typeface="+mj-ea"/>
+                <a:cs typeface="+mj-cs"/>
+              </a:rPr>
+              <a:t>• await returns whatever the </a:t>
+            </a:r>
+            <a:r>
+              <a:rPr lang="en-US" sz="2800" dirty="0" err="1">
+                <a:solidFill>
+                  <a:schemeClr val="tx1">
+                    <a:lumMod val="50000"/>
+                    <a:lumOff val="50000"/>
+                  </a:schemeClr>
+                </a:solidFill>
+                <a:latin typeface="+mj-lt"/>
+                <a:ea typeface="+mj-ea"/>
+                <a:cs typeface="+mj-cs"/>
+              </a:rPr>
+              <a:t>async</a:t>
+            </a:r>
+            <a:r>
+              <a:rPr lang="en-US" sz="2800" dirty="0">
+                <a:solidFill>
+                  <a:schemeClr val="tx1">
+                    <a:lumMod val="50000"/>
+                    <a:lumOff val="50000"/>
+                  </a:schemeClr>
+                </a:solidFill>
+                <a:latin typeface="+mj-lt"/>
+                <a:ea typeface="+mj-ea"/>
+                <a:cs typeface="+mj-cs"/>
+              </a:rPr>
+              <a:t> function returns when it is done</a:t>
+            </a:r>
+            <a:r>
+              <a:rPr lang="en-US" sz="2800" dirty="0">
+                <a:solidFill>
+                  <a:schemeClr val="tx1">
+                    <a:lumMod val="50000"/>
+                    <a:lumOff val="50000"/>
+                  </a:schemeClr>
+                </a:solidFill>
+                <a:latin typeface="+mj-lt"/>
+                <a:ea typeface="+mj-ea"/>
+                <a:cs typeface="+mj-cs"/>
+              </a:rPr>
+              <a:t>.</a:t>
+            </a:r>
+          </a:p>
+          <a:p>
+            <a:r>
+              <a:rPr lang="en-US" sz="2800" dirty="0">
+                <a:solidFill>
+                  <a:schemeClr val="tx1">
+                    <a:lumMod val="50000"/>
+                    <a:lumOff val="50000"/>
+                  </a:schemeClr>
+                </a:solidFill>
+                <a:latin typeface="+mj-lt"/>
+                <a:ea typeface="+mj-ea"/>
+                <a:cs typeface="+mj-cs"/>
+              </a:rPr>
+              <a:t/>
+            </a:r>
+            <a:br>
+              <a:rPr lang="en-US" sz="2800" dirty="0">
+                <a:solidFill>
+                  <a:schemeClr val="tx1">
+                    <a:lumMod val="50000"/>
+                    <a:lumOff val="50000"/>
+                  </a:schemeClr>
+                </a:solidFill>
+                <a:latin typeface="+mj-lt"/>
+                <a:ea typeface="+mj-ea"/>
+                <a:cs typeface="+mj-cs"/>
+              </a:rPr>
+            </a:br>
+            <a:r>
+              <a:rPr lang="en-US" sz="2800" dirty="0">
+                <a:solidFill>
+                  <a:schemeClr val="tx1">
+                    <a:lumMod val="50000"/>
+                    <a:lumOff val="50000"/>
+                  </a:schemeClr>
+                </a:solidFill>
+                <a:latin typeface="+mj-lt"/>
+                <a:ea typeface="+mj-ea"/>
+                <a:cs typeface="+mj-cs"/>
+              </a:rPr>
+              <a:t>• await can only be used inside an </a:t>
+            </a:r>
+            <a:r>
+              <a:rPr lang="en-US" sz="2800" dirty="0" err="1">
+                <a:solidFill>
+                  <a:schemeClr val="tx1">
+                    <a:lumMod val="50000"/>
+                    <a:lumOff val="50000"/>
+                  </a:schemeClr>
+                </a:solidFill>
+                <a:latin typeface="+mj-lt"/>
+                <a:ea typeface="+mj-ea"/>
+                <a:cs typeface="+mj-cs"/>
+              </a:rPr>
+              <a:t>async</a:t>
+            </a:r>
+            <a:r>
+              <a:rPr lang="en-US" sz="2800" dirty="0">
+                <a:solidFill>
+                  <a:schemeClr val="tx1">
+                    <a:lumMod val="50000"/>
+                    <a:lumOff val="50000"/>
+                  </a:schemeClr>
+                </a:solidFill>
+                <a:latin typeface="+mj-lt"/>
+                <a:ea typeface="+mj-ea"/>
+                <a:cs typeface="+mj-cs"/>
+              </a:rPr>
+              <a:t> function</a:t>
+            </a:r>
+            <a:r>
               <a:rPr lang="en-US" sz="2000" dirty="0">
                 <a:solidFill>
                   <a:schemeClr val="bg2">
@@ -10451,244 +10641,7 @@
                 <a:ea typeface="+mj-ea"/>
                 <a:cs typeface="+mj-cs"/>
               </a:rPr>
-              <a:t>• Async functions are declared by prepending the word </a:t>
-            </a:r>
-            <a:r>
-              <a:rPr lang="en-US" sz="2000" dirty="0" err="1">
-                <a:solidFill>
-                  <a:schemeClr val="bg2">
-                    <a:lumMod val="50000"/>
-                  </a:schemeClr>
-                </a:solidFill>
-                <a:latin typeface="+mj-lt"/>
-                <a:ea typeface="+mj-ea"/>
-                <a:cs typeface="+mj-cs"/>
-              </a:rPr>
-              <a:t>async</a:t>
-            </a:r>
-            <a:r>
-              <a:rPr lang="en-US" sz="2000" dirty="0">
-                <a:solidFill>
-                  <a:schemeClr val="bg2">
-                    <a:lumMod val="50000"/>
-                  </a:schemeClr>
-                </a:solidFill>
-                <a:latin typeface="+mj-lt"/>
-                <a:ea typeface="+mj-ea"/>
-                <a:cs typeface="+mj-cs"/>
-              </a:rPr>
-              <a:t> in their </a:t>
-            </a:r>
-            <a:r>
-              <a:rPr lang="en-US" sz="2000" dirty="0" smtClean="0">
-                <a:solidFill>
-                  <a:schemeClr val="bg2">
-                    <a:lumMod val="50000"/>
-                  </a:schemeClr>
-                </a:solidFill>
-                <a:latin typeface="+mj-lt"/>
-                <a:ea typeface="+mj-ea"/>
-                <a:cs typeface="+mj-cs"/>
-              </a:rPr>
-              <a:t>declaration</a:t>
-            </a:r>
-          </a:p>
-          <a:p>
-            <a:r>
-              <a:rPr lang="en-US" sz="2000" dirty="0">
-                <a:solidFill>
-                  <a:schemeClr val="bg2">
-                    <a:lumMod val="50000"/>
-                  </a:schemeClr>
-                </a:solidFill>
-                <a:latin typeface="+mj-lt"/>
-                <a:ea typeface="+mj-ea"/>
-                <a:cs typeface="+mj-cs"/>
-              </a:rPr>
-              <a:t/>
-            </a:r>
-            <a:br>
-              <a:rPr lang="en-US" sz="2000" dirty="0">
-                <a:solidFill>
-                  <a:schemeClr val="bg2">
-                    <a:lumMod val="50000"/>
-                  </a:schemeClr>
-                </a:solidFill>
-                <a:latin typeface="+mj-lt"/>
-                <a:ea typeface="+mj-ea"/>
-                <a:cs typeface="+mj-cs"/>
-              </a:rPr>
-            </a:br>
-            <a:r>
-              <a:rPr lang="en-US" sz="2000" dirty="0">
-                <a:solidFill>
-                  <a:schemeClr val="bg2">
-                    <a:lumMod val="50000"/>
-                  </a:schemeClr>
-                </a:solidFill>
-                <a:latin typeface="+mj-lt"/>
-                <a:ea typeface="+mj-ea"/>
-                <a:cs typeface="+mj-cs"/>
-              </a:rPr>
-              <a:t>• Your code can be paused waiting for an Async Function with await</a:t>
-            </a:r>
-            <a:r>
-              <a:rPr lang="en-US" sz="2000" dirty="0" smtClean="0">
-                <a:solidFill>
-                  <a:schemeClr val="bg2">
-                    <a:lumMod val="50000"/>
-                  </a:schemeClr>
-                </a:solidFill>
-                <a:latin typeface="+mj-lt"/>
-                <a:ea typeface="+mj-ea"/>
-                <a:cs typeface="+mj-cs"/>
-              </a:rPr>
               <a:t>.</a:t>
-            </a:r>
-          </a:p>
-          <a:p>
-            <a:r>
-              <a:rPr lang="en-US" sz="2000" dirty="0">
-                <a:solidFill>
-                  <a:schemeClr val="bg2">
-                    <a:lumMod val="50000"/>
-                  </a:schemeClr>
-                </a:solidFill>
-                <a:latin typeface="+mj-lt"/>
-                <a:ea typeface="+mj-ea"/>
-                <a:cs typeface="+mj-cs"/>
-              </a:rPr>
-              <a:t/>
-            </a:r>
-            <a:br>
-              <a:rPr lang="en-US" sz="2000" dirty="0">
-                <a:solidFill>
-                  <a:schemeClr val="bg2">
-                    <a:lumMod val="50000"/>
-                  </a:schemeClr>
-                </a:solidFill>
-                <a:latin typeface="+mj-lt"/>
-                <a:ea typeface="+mj-ea"/>
-                <a:cs typeface="+mj-cs"/>
-              </a:rPr>
-            </a:br>
-            <a:r>
-              <a:rPr lang="en-US" sz="2000" dirty="0">
-                <a:solidFill>
-                  <a:schemeClr val="bg2">
-                    <a:lumMod val="50000"/>
-                  </a:schemeClr>
-                </a:solidFill>
-                <a:latin typeface="+mj-lt"/>
-                <a:ea typeface="+mj-ea"/>
-                <a:cs typeface="+mj-cs"/>
-              </a:rPr>
-              <a:t>• await returns whatever the </a:t>
-            </a:r>
-            <a:r>
-              <a:rPr lang="en-US" sz="2000" dirty="0" err="1">
-                <a:solidFill>
-                  <a:schemeClr val="bg2">
-                    <a:lumMod val="50000"/>
-                  </a:schemeClr>
-                </a:solidFill>
-                <a:latin typeface="+mj-lt"/>
-                <a:ea typeface="+mj-ea"/>
-                <a:cs typeface="+mj-cs"/>
-              </a:rPr>
-              <a:t>async</a:t>
-            </a:r>
-            <a:r>
-              <a:rPr lang="en-US" sz="2000" dirty="0">
-                <a:solidFill>
-                  <a:schemeClr val="bg2">
-                    <a:lumMod val="50000"/>
-                  </a:schemeClr>
-                </a:solidFill>
-                <a:latin typeface="+mj-lt"/>
-                <a:ea typeface="+mj-ea"/>
-                <a:cs typeface="+mj-cs"/>
-              </a:rPr>
-              <a:t> function returns when it is done</a:t>
-            </a:r>
-            <a:r>
-              <a:rPr lang="en-US" sz="2000" dirty="0" smtClean="0">
-                <a:solidFill>
-                  <a:schemeClr val="bg2">
-                    <a:lumMod val="50000"/>
-                  </a:schemeClr>
-                </a:solidFill>
-                <a:latin typeface="+mj-lt"/>
-                <a:ea typeface="+mj-ea"/>
-                <a:cs typeface="+mj-cs"/>
-              </a:rPr>
-              <a:t>.</a:t>
-            </a:r>
-          </a:p>
-          <a:p>
-            <a:r>
-              <a:rPr lang="en-US" sz="2000" dirty="0">
-                <a:solidFill>
-                  <a:schemeClr val="bg2">
-                    <a:lumMod val="50000"/>
-                  </a:schemeClr>
-                </a:solidFill>
-                <a:latin typeface="+mj-lt"/>
-                <a:ea typeface="+mj-ea"/>
-                <a:cs typeface="+mj-cs"/>
-              </a:rPr>
-              <a:t/>
-            </a:r>
-            <a:br>
-              <a:rPr lang="en-US" sz="2000" dirty="0">
-                <a:solidFill>
-                  <a:schemeClr val="bg2">
-                    <a:lumMod val="50000"/>
-                  </a:schemeClr>
-                </a:solidFill>
-                <a:latin typeface="+mj-lt"/>
-                <a:ea typeface="+mj-ea"/>
-                <a:cs typeface="+mj-cs"/>
-              </a:rPr>
-            </a:br>
-            <a:r>
-              <a:rPr lang="en-US" sz="2000" dirty="0">
-                <a:solidFill>
-                  <a:schemeClr val="bg2">
-                    <a:lumMod val="50000"/>
-                  </a:schemeClr>
-                </a:solidFill>
-                <a:latin typeface="+mj-lt"/>
-                <a:ea typeface="+mj-ea"/>
-                <a:cs typeface="+mj-cs"/>
-              </a:rPr>
-              <a:t>• await can only be used inside an </a:t>
-            </a:r>
-            <a:r>
-              <a:rPr lang="en-US" sz="2000" dirty="0" err="1">
-                <a:solidFill>
-                  <a:schemeClr val="bg2">
-                    <a:lumMod val="50000"/>
-                  </a:schemeClr>
-                </a:solidFill>
-                <a:latin typeface="+mj-lt"/>
-                <a:ea typeface="+mj-ea"/>
-                <a:cs typeface="+mj-cs"/>
-              </a:rPr>
-              <a:t>async</a:t>
-            </a:r>
-            <a:r>
-              <a:rPr lang="en-US" sz="2000" dirty="0">
-                <a:solidFill>
-                  <a:schemeClr val="bg2">
-                    <a:lumMod val="50000"/>
-                  </a:schemeClr>
-                </a:solidFill>
-                <a:latin typeface="+mj-lt"/>
-                <a:ea typeface="+mj-ea"/>
-                <a:cs typeface="+mj-cs"/>
-              </a:rPr>
-              <a:t> function.</a:t>
             </a:r>
           </a:p>
         </p:txBody>
@@ -11914,8 +11867,8 @@
         </p:nvSpPr>
         <p:spPr>
           <a:xfrm>
-            <a:off x="2402155" y="2706130"/>
-            <a:ext cx="10174361" cy="824862"/>
+            <a:off x="2315070" y="2525486"/>
+            <a:ext cx="10174361" cy="1005506"/>
           </a:xfrm>
         </p:spPr>
         <p:txBody>
@@ -11979,8 +11932,9 @@
             <a:r>
               <a:rPr lang="en-US" sz="2800" dirty="0">
                 <a:solidFill>
-                  <a:schemeClr val="bg2">
+                  <a:schemeClr val="tx1">
                     <a:lumMod val="50000"/>
+                    <a:lumOff val="50000"/>
                   </a:schemeClr>
                 </a:solidFill>
                 <a:latin typeface="+mj-lt"/>
@@ -11992,8 +11946,9 @@
             <a:r>
               <a:rPr lang="en-US" sz="2800" dirty="0" smtClean="0">
                 <a:solidFill>
-                  <a:schemeClr val="bg2">
+                  <a:schemeClr val="tx1">
                     <a:lumMod val="50000"/>
+                    <a:lumOff val="50000"/>
                   </a:schemeClr>
                 </a:solidFill>
                 <a:latin typeface="+mj-lt"/>
@@ -12005,8 +11960,9 @@
             <a:r>
               <a:rPr lang="en-US" sz="2800" dirty="0">
                 <a:solidFill>
-                  <a:schemeClr val="bg2">
+                  <a:schemeClr val="tx1">
                     <a:lumMod val="50000"/>
+                    <a:lumOff val="50000"/>
                   </a:schemeClr>
                 </a:solidFill>
                 <a:latin typeface="+mj-lt"/>
@@ -12018,8 +11974,9 @@
             <a:r>
               <a:rPr lang="en-US" sz="2800" dirty="0">
                 <a:solidFill>
-                  <a:schemeClr val="bg2">
+                  <a:schemeClr val="tx1">
                     <a:lumMod val="50000"/>
+                    <a:lumOff val="50000"/>
                   </a:schemeClr>
                 </a:solidFill>
                 <a:latin typeface="+mj-lt"/>
@@ -12031,8 +11988,9 @@
             <a:r>
               <a:rPr lang="en-US" sz="2800" dirty="0">
                 <a:solidFill>
-                  <a:schemeClr val="bg2">
+                  <a:schemeClr val="tx1">
                     <a:lumMod val="50000"/>
+                    <a:lumOff val="50000"/>
                   </a:schemeClr>
                 </a:solidFill>
                 <a:latin typeface="+mj-lt"/>
@@ -12044,8 +12002,9 @@
             <a:r>
               <a:rPr lang="en-US" sz="2800" dirty="0" smtClean="0">
                 <a:solidFill>
-                  <a:schemeClr val="bg2">
+                  <a:schemeClr val="tx1">
                     <a:lumMod val="50000"/>
+                    <a:lumOff val="50000"/>
                   </a:schemeClr>
                 </a:solidFill>
                 <a:latin typeface="+mj-lt"/>
@@ -12058,8 +12017,9 @@
           <a:p>
             <a:endParaRPr lang="en-US" sz="2800" dirty="0" smtClean="0">
               <a:solidFill>
-                <a:schemeClr val="bg2">
+                <a:schemeClr val="tx1">
                   <a:lumMod val="50000"/>
+                  <a:lumOff val="50000"/>
                 </a:schemeClr>
               </a:solidFill>
               <a:latin typeface="+mj-lt"/>
@@ -12071,8 +12031,9 @@
             <a:r>
               <a:rPr lang="en-US" sz="2800" dirty="0" smtClean="0">
                 <a:solidFill>
-                  <a:schemeClr val="bg2">
+                  <a:schemeClr val="tx1">
                     <a:lumMod val="50000"/>
+                    <a:lumOff val="50000"/>
                   </a:schemeClr>
                 </a:solidFill>
                 <a:latin typeface="+mj-lt"/>
@@ -12084,8 +12045,9 @@
             <a:r>
               <a:rPr lang="en-US" sz="2800" dirty="0">
                 <a:solidFill>
-                  <a:schemeClr val="bg2">
+                  <a:schemeClr val="tx1">
                     <a:lumMod val="50000"/>
+                    <a:lumOff val="50000"/>
                   </a:schemeClr>
                 </a:solidFill>
                 <a:latin typeface="+mj-lt"/>
@@ -12097,8 +12059,9 @@
             <a:r>
               <a:rPr lang="en-US" sz="2800" b="1" dirty="0">
                 <a:solidFill>
-                  <a:schemeClr val="bg2">
+                  <a:schemeClr val="tx1">
                     <a:lumMod val="50000"/>
+                    <a:lumOff val="50000"/>
                   </a:schemeClr>
                 </a:solidFill>
                 <a:latin typeface="+mj-lt"/>
@@ -12110,8 +12073,9 @@
             <a:r>
               <a:rPr lang="en-US" sz="2800" b="1" dirty="0" smtClean="0">
                 <a:solidFill>
-                  <a:schemeClr val="bg2">
+                  <a:schemeClr val="tx1">
                     <a:lumMod val="50000"/>
+                    <a:lumOff val="50000"/>
                   </a:schemeClr>
                 </a:solidFill>
                 <a:latin typeface="+mj-lt"/>
@@ -12123,8 +12087,9 @@
             <a:r>
               <a:rPr lang="en-US" sz="2800" dirty="0" smtClean="0">
                 <a:solidFill>
-                  <a:schemeClr val="bg2">
+                  <a:schemeClr val="tx1">
                     <a:lumMod val="50000"/>
+                    <a:lumOff val="50000"/>
                   </a:schemeClr>
                 </a:solidFill>
                 <a:latin typeface="+mj-lt"/>
@@ -12135,8 +12100,9 @@
             </a:r>
             <a:endParaRPr lang="en-US" sz="2800" dirty="0">
               <a:solidFill>
-                <a:schemeClr val="bg2">
+                <a:schemeClr val="tx1">
                   <a:lumMod val="50000"/>
+                  <a:lumOff val="50000"/>
                 </a:schemeClr>
               </a:solidFill>
               <a:latin typeface="+mj-lt"/>
@@ -13653,7 +13619,7 @@
         </p:nvSpPr>
         <p:spPr>
           <a:xfrm>
-            <a:off x="3174609" y="4043289"/>
+            <a:off x="3319751" y="4086773"/>
             <a:ext cx="6096000" cy="1384995"/>
           </a:xfrm>
           <a:prstGeom prst="rect">
@@ -13669,8 +13635,9 @@
             <a:r>
               <a:rPr lang="en-US" sz="2800" dirty="0">
                 <a:solidFill>
-                  <a:schemeClr val="bg2">
+                  <a:schemeClr val="tx1">
                     <a:lumMod val="50000"/>
+                    <a:lumOff val="50000"/>
                   </a:schemeClr>
                 </a:solidFill>
                 <a:latin typeface="+mj-lt"/>

</xml_diff>

<commit_message>
added references in ppt
</commit_message>
<xml_diff>
--- a/SPHERO.pptx
+++ b/SPHERO.pptx
@@ -5,7 +5,7 @@
     <p:sldMasterId id="2147483648" r:id="rId1"/>
   </p:sldMasterIdLst>
   <p:notesMasterIdLst>
-    <p:notesMasterId r:id="rId14"/>
+    <p:notesMasterId r:id="rId15"/>
   </p:notesMasterIdLst>
   <p:sldIdLst>
     <p:sldId id="256" r:id="rId2"/>
@@ -20,6 +20,7 @@
     <p:sldId id="266" r:id="rId11"/>
     <p:sldId id="265" r:id="rId12"/>
     <p:sldId id="267" r:id="rId13"/>
+    <p:sldId id="268" r:id="rId14"/>
   </p:sldIdLst>
   <p:sldSz cx="12192000" cy="6858000"/>
   <p:notesSz cx="6858000" cy="9144000"/>
@@ -11413,6 +11414,188 @@
     <p:extLst>
       <p:ext uri="{BB962C8B-B14F-4D97-AF65-F5344CB8AC3E}">
         <p14:creationId xmlns:p14="http://schemas.microsoft.com/office/powerpoint/2010/main" val="3403874278"/>
+      </p:ext>
+    </p:extLst>
+  </p:cSld>
+  <p:clrMapOvr>
+    <a:masterClrMapping/>
+  </p:clrMapOvr>
+  <p:timing>
+    <p:tnLst>
+      <p:par>
+        <p:cTn id="1" dur="indefinite" restart="never" nodeType="tmRoot"/>
+      </p:par>
+    </p:tnLst>
+  </p:timing>
+</p:sld>
+</file>
+
+<file path=ppt/slides/slide13.xml><?xml version="1.0" encoding="utf-8"?>
+<p:sld xmlns:a="http://schemas.openxmlformats.org/drawingml/2006/main" xmlns:r="http://schemas.openxmlformats.org/officeDocument/2006/relationships" xmlns:p="http://schemas.openxmlformats.org/presentationml/2006/main">
+  <p:cSld>
+    <p:spTree>
+      <p:nvGrpSpPr>
+        <p:cNvPr id="1" name=""/>
+        <p:cNvGrpSpPr/>
+        <p:nvPr/>
+      </p:nvGrpSpPr>
+      <p:grpSpPr>
+        <a:xfrm>
+          <a:off x="0" y="0"/>
+          <a:ext cx="0" cy="0"/>
+          <a:chOff x="0" y="0"/>
+          <a:chExt cx="0" cy="0"/>
+        </a:xfrm>
+      </p:grpSpPr>
+      <p:sp>
+        <p:nvSpPr>
+          <p:cNvPr id="2" name="Title 1"/>
+          <p:cNvSpPr>
+            <a:spLocks noGrp="1"/>
+          </p:cNvSpPr>
+          <p:nvPr>
+            <p:ph type="title"/>
+          </p:nvPr>
+        </p:nvSpPr>
+        <p:spPr/>
+        <p:txBody>
+          <a:bodyPr/>
+          <a:lstStyle/>
+          <a:p>
+            <a:r>
+              <a:rPr lang="en-US" dirty="0" smtClean="0"/>
+              <a:t>References</a:t>
+            </a:r>
+            <a:endParaRPr lang="en-US" dirty="0"/>
+          </a:p>
+        </p:txBody>
+      </p:sp>
+      <p:sp>
+        <p:nvSpPr>
+          <p:cNvPr id="3" name="Rectangle 2"/>
+          <p:cNvSpPr/>
+          <p:nvPr/>
+        </p:nvSpPr>
+        <p:spPr>
+          <a:xfrm>
+            <a:off x="2592924" y="2274838"/>
+            <a:ext cx="8771762" cy="2031325"/>
+          </a:xfrm>
+          <a:prstGeom prst="rect">
+            <a:avLst/>
+          </a:prstGeom>
+        </p:spPr>
+        <p:txBody>
+          <a:bodyPr wrap="square">
+            <a:spAutoFit/>
+          </a:bodyPr>
+          <a:lstStyle/>
+          <a:p>
+            <a:r>
+              <a:rPr lang="en-US" dirty="0" smtClean="0">
+                <a:hlinkClick r:id="rId2"/>
+              </a:rPr>
+              <a:t>https</a:t>
+            </a:r>
+            <a:r>
+              <a:rPr lang="en-US" dirty="0">
+                <a:hlinkClick r:id="rId2"/>
+              </a:rPr>
+              <a:t>://</a:t>
+            </a:r>
+            <a:r>
+              <a:rPr lang="en-US" dirty="0" smtClean="0">
+                <a:hlinkClick r:id="rId2"/>
+              </a:rPr>
+              <a:t>developer.mozilla.org/en-US/docs/Web/JavaScript/Reference/Statements/async_function</a:t>
+            </a:r>
+            <a:endParaRPr lang="en-US" dirty="0"/>
+          </a:p>
+          <a:p>
+            <a:endParaRPr lang="en-US" dirty="0"/>
+          </a:p>
+          <a:p>
+            <a:r>
+              <a:rPr lang="en-US" dirty="0">
+                <a:hlinkClick r:id="rId3"/>
+              </a:rPr>
+              <a:t>https://</a:t>
+            </a:r>
+            <a:r>
+              <a:rPr lang="en-US" dirty="0" smtClean="0">
+                <a:hlinkClick r:id="rId3"/>
+              </a:rPr>
+              <a:t>developers.google.com/web/fundamentals/primers/promises</a:t>
+            </a:r>
+            <a:endParaRPr lang="en-US" dirty="0" smtClean="0"/>
+          </a:p>
+          <a:p>
+            <a:endParaRPr lang="en-US" dirty="0"/>
+          </a:p>
+          <a:p>
+            <a:r>
+              <a:rPr lang="en-US" dirty="0">
+                <a:hlinkClick r:id="rId4"/>
+              </a:rPr>
+              <a:t>https://</a:t>
+            </a:r>
+            <a:r>
+              <a:rPr lang="en-US" dirty="0" smtClean="0">
+                <a:hlinkClick r:id="rId4"/>
+              </a:rPr>
+              <a:t>javascript.info/promise-basics</a:t>
+            </a:r>
+            <a:endParaRPr lang="en-US" dirty="0" smtClean="0"/>
+          </a:p>
+          <a:p>
+            <a:endParaRPr lang="en-US" dirty="0"/>
+          </a:p>
+        </p:txBody>
+      </p:sp>
+      <p:sp>
+        <p:nvSpPr>
+          <p:cNvPr id="4" name="Rectangle 3"/>
+          <p:cNvSpPr/>
+          <p:nvPr/>
+        </p:nvSpPr>
+        <p:spPr>
+          <a:xfrm>
+            <a:off x="2592924" y="4165378"/>
+            <a:ext cx="6096000" cy="923330"/>
+          </a:xfrm>
+          <a:prstGeom prst="rect">
+            <a:avLst/>
+          </a:prstGeom>
+        </p:spPr>
+        <p:txBody>
+          <a:bodyPr>
+            <a:spAutoFit/>
+          </a:bodyPr>
+          <a:lstStyle/>
+          <a:p>
+            <a:r>
+              <a:rPr lang="en-US" dirty="0">
+                <a:hlinkClick r:id="rId5"/>
+              </a:rPr>
+              <a:t>https://medium.com/@</a:t>
+            </a:r>
+            <a:r>
+              <a:rPr lang="en-US" dirty="0" smtClean="0">
+                <a:hlinkClick r:id="rId5"/>
+              </a:rPr>
+              <a:t>rafaelvidaurre?source=post_header_lockup</a:t>
+            </a:r>
+            <a:endParaRPr lang="en-US" dirty="0" smtClean="0"/>
+          </a:p>
+          <a:p>
+            <a:endParaRPr lang="en-US" dirty="0" smtClean="0"/>
+          </a:p>
+        </p:txBody>
+      </p:sp>
+    </p:spTree>
+    <p:extLst>
+      <p:ext uri="{BB962C8B-B14F-4D97-AF65-F5344CB8AC3E}">
+        <p14:creationId xmlns:p14="http://schemas.microsoft.com/office/powerpoint/2010/main" val="2339336131"/>
       </p:ext>
     </p:extLst>
   </p:cSld>

</xml_diff>